<commit_message>
minor change to lsn 11 slides
</commit_message>
<xml_diff>
--- a/lecture/slides/ECE_383_Lec11.pptx
+++ b/lecture/slides/ECE_383_Lec11.pptx
@@ -6,10 +6,10 @@
     <p:sldMasterId id="2147483687" r:id="rId2"/>
   </p:sldMasterIdLst>
   <p:notesMasterIdLst>
-    <p:notesMasterId r:id="rId24"/>
+    <p:notesMasterId r:id="rId23"/>
   </p:notesMasterIdLst>
   <p:handoutMasterIdLst>
-    <p:handoutMasterId r:id="rId25"/>
+    <p:handoutMasterId r:id="rId24"/>
   </p:handoutMasterIdLst>
   <p:sldIdLst>
     <p:sldId id="299" r:id="rId3"/>
@@ -23,16 +23,15 @@
     <p:sldId id="361" r:id="rId11"/>
     <p:sldId id="365" r:id="rId12"/>
     <p:sldId id="362" r:id="rId13"/>
-    <p:sldId id="368" r:id="rId14"/>
-    <p:sldId id="367" r:id="rId15"/>
-    <p:sldId id="366" r:id="rId16"/>
-    <p:sldId id="369" r:id="rId17"/>
-    <p:sldId id="363" r:id="rId18"/>
-    <p:sldId id="364" r:id="rId19"/>
-    <p:sldId id="371" r:id="rId20"/>
-    <p:sldId id="372" r:id="rId21"/>
-    <p:sldId id="373" r:id="rId22"/>
-    <p:sldId id="374" r:id="rId23"/>
+    <p:sldId id="367" r:id="rId14"/>
+    <p:sldId id="366" r:id="rId15"/>
+    <p:sldId id="369" r:id="rId16"/>
+    <p:sldId id="363" r:id="rId17"/>
+    <p:sldId id="364" r:id="rId18"/>
+    <p:sldId id="371" r:id="rId19"/>
+    <p:sldId id="372" r:id="rId20"/>
+    <p:sldId id="373" r:id="rId21"/>
+    <p:sldId id="374" r:id="rId22"/>
   </p:sldIdLst>
   <p:sldSz cx="9144000" cy="6858000" type="screen4x3"/>
   <p:notesSz cx="6985000" cy="9283700"/>
@@ -9615,8 +9614,8 @@
           <a:lstStyle/>
           <a:p>
             <a:r>
-              <a:rPr lang="en-US" dirty="0" smtClean="0"/>
-              <a:t>VHDL Instantiation</a:t>
+              <a:rPr lang="en-US" dirty="0"/>
+              <a:t>Unused outputs and open keyword</a:t>
             </a:r>
             <a:endParaRPr lang="en-US" dirty="0"/>
           </a:p>
@@ -9844,7 +9843,7 @@
     </p:spTree>
     <p:extLst>
       <p:ext uri="{BB962C8B-B14F-4D97-AF65-F5344CB8AC3E}">
-        <p14:creationId xmlns:p14="http://schemas.microsoft.com/office/powerpoint/2010/main" val="245659837"/>
+        <p14:creationId xmlns:p14="http://schemas.microsoft.com/office/powerpoint/2010/main" val="1376756073"/>
       </p:ext>
     </p:extLst>
   </p:cSld>
@@ -10064,8 +10063,12 @@
           <a:lstStyle/>
           <a:p>
             <a:r>
-              <a:rPr lang="en-US" dirty="0"/>
-              <a:t>Unused outputs and open keyword</a:t>
+              <a:rPr lang="en-US" dirty="0" err="1" smtClean="0"/>
+              <a:t>Subvectors</a:t>
+            </a:r>
+            <a:r>
+              <a:rPr lang="en-US" dirty="0" smtClean="0"/>
+              <a:t> and Concatenation</a:t>
             </a:r>
             <a:endParaRPr lang="en-US" dirty="0"/>
           </a:p>
@@ -10092,159 +10095,67 @@
           <a:lstStyle/>
           <a:p>
             <a:r>
+              <a:rPr lang="en-US" dirty="0" smtClean="0"/>
+              <a:t>There </a:t>
+            </a:r>
+            <a:r>
               <a:rPr lang="en-US" dirty="0"/>
-              <a:t>However, we could shorten this instantiation by using the default binding calling </a:t>
-            </a:r>
+              <a:t>are times when we will need to rebuild a </a:t>
+            </a:r>
+            <a:r>
+              <a:rPr lang="en-US" dirty="0" err="1"/>
+              <a:t>std_logic_vector</a:t>
+            </a:r>
+            <a:r>
+              <a:rPr lang="en-US" dirty="0"/>
+              <a:t> from pieces of other vectors. </a:t>
+            </a:r>
+            <a:endParaRPr lang="en-US" dirty="0" smtClean="0"/>
+          </a:p>
+          <a:p>
             <a:r>
               <a:rPr lang="en-US" dirty="0" smtClean="0"/>
-              <a:t>convention below:</a:t>
-            </a:r>
-          </a:p>
-          <a:p>
-            <a:pPr marL="741363" lvl="2" indent="0">
-              <a:buNone/>
-            </a:pPr>
-            <a:r>
-              <a:rPr lang="en-US" sz="1800" dirty="0"/>
-              <a:t>entity compare is</a:t>
-            </a:r>
-          </a:p>
-          <a:p>
-            <a:pPr marL="741363" lvl="2" indent="0">
-              <a:buNone/>
-            </a:pPr>
-            <a:r>
-              <a:rPr lang="en-US" sz="1800" dirty="0"/>
-              <a:t>    generic(N: integer := 4);</a:t>
-            </a:r>
-          </a:p>
-          <a:p>
-            <a:pPr marL="741363" lvl="2" indent="0">
-              <a:buNone/>
-            </a:pPr>
-            <a:r>
-              <a:rPr lang="en-US" sz="1800" dirty="0"/>
-              <a:t>    port(</a:t>
-            </a:r>
-            <a:r>
-              <a:rPr lang="en-US" sz="1800" dirty="0" err="1"/>
-              <a:t>x,y</a:t>
-            </a:r>
-            <a:r>
-              <a:rPr lang="en-US" sz="1800" dirty="0"/>
-              <a:t> : in unsigned(N-1 </a:t>
-            </a:r>
-            <a:r>
-              <a:rPr lang="en-US" sz="1800" dirty="0" err="1"/>
+              <a:t>Vector is defined </a:t>
+            </a:r>
+            <a:r>
+              <a:rPr lang="en-US" dirty="0"/>
+              <a:t>as signal(7 </a:t>
+            </a:r>
+            <a:r>
+              <a:rPr lang="en-US" dirty="0" err="1"/>
               <a:t>downto</a:t>
             </a:r>
             <a:r>
-              <a:rPr lang="en-US" sz="1800" dirty="0"/>
-              <a:t> 0);</a:t>
-            </a:r>
-          </a:p>
-          <a:p>
-            <a:pPr marL="741363" lvl="2" indent="0">
-              <a:buNone/>
-            </a:pPr>
-            <a:r>
-              <a:rPr lang="en-US" sz="1800" dirty="0"/>
-              <a:t>         </a:t>
-            </a:r>
-            <a:r>
-              <a:rPr lang="en-US" sz="1800" dirty="0" err="1"/>
-              <a:t>g,l,e</a:t>
-            </a:r>
-            <a:r>
-              <a:rPr lang="en-US" sz="1800" dirty="0"/>
-              <a:t>: out </a:t>
-            </a:r>
-            <a:r>
-              <a:rPr lang="en-US" sz="1800" dirty="0" err="1"/>
-              <a:t>std_logic</a:t>
-            </a:r>
-            <a:r>
-              <a:rPr lang="en-US" sz="1800" dirty="0"/>
-              <a:t>);</a:t>
-            </a:r>
-          </a:p>
-          <a:p>
-            <a:pPr marL="741363" lvl="2" indent="0">
-              <a:buNone/>
-            </a:pPr>
-            <a:r>
-              <a:rPr lang="en-US" sz="1800" dirty="0"/>
-              <a:t>end compare</a:t>
-            </a:r>
-            <a:r>
-              <a:rPr lang="en-US" sz="1800" dirty="0" smtClean="0"/>
-              <a:t>;</a:t>
-            </a:r>
-          </a:p>
-          <a:p>
-            <a:pPr marL="342900" indent="-342900"/>
+              <a:rPr lang="en-US" dirty="0"/>
+              <a:t> 0), you can replace the limits with anything in between to get a small </a:t>
+            </a:r>
+            <a:r>
+              <a:rPr lang="en-US" dirty="0" err="1" smtClean="0"/>
+              <a:t>subvector</a:t>
+            </a:r>
+            <a:endParaRPr lang="en-US" dirty="0"/>
+          </a:p>
+          <a:p>
             <a:r>
               <a:rPr lang="en-US" dirty="0" smtClean="0"/>
-              <a:t>Important </a:t>
+              <a:t>For example</a:t>
             </a:r>
             <a:r>
               <a:rPr lang="en-US" dirty="0"/>
-              <a:t>Note:  Note that g=1 when x&gt;y, and l=1 when </a:t>
-            </a:r>
-            <a:r>
-              <a:rPr lang="en-US" dirty="0" smtClean="0"/>
-              <a:t>x&lt;Y and e=1 when x=y </a:t>
-            </a:r>
-          </a:p>
-          <a:p>
-            <a:pPr marL="746125" lvl="1" indent="-342900"/>
-            <a:r>
-              <a:rPr lang="en-US" sz="2000" dirty="0" smtClean="0"/>
-              <a:t>example: compare </a:t>
-            </a:r>
-            <a:r>
-              <a:rPr lang="en-US" sz="2000" dirty="0"/>
-              <a:t>port map (A,B,OPEN, OPEN, equal); </a:t>
-            </a:r>
-            <a:endParaRPr lang="en-US" sz="2000" dirty="0" smtClean="0"/>
-          </a:p>
-          <a:p>
-            <a:pPr marL="746125" lvl="1" indent="-342900"/>
-            <a:r>
-              <a:rPr lang="en-US" dirty="0" smtClean="0"/>
-              <a:t>Synthesis </a:t>
+              <a:t>, you could ask for signal(5 </a:t>
+            </a:r>
+            <a:r>
+              <a:rPr lang="en-US" dirty="0" err="1"/>
+              <a:t>downto</a:t>
             </a:r>
             <a:r>
               <a:rPr lang="en-US" dirty="0"/>
-              <a:t>engine </a:t>
-            </a:r>
-            <a:r>
-              <a:rPr lang="en-US" dirty="0" smtClean="0"/>
-              <a:t>can remove </a:t>
-            </a:r>
-            <a:r>
-              <a:rPr lang="en-US" dirty="0"/>
-              <a:t>the logic associated with any of the OPEN signals and reduce </a:t>
-            </a:r>
-            <a:r>
-              <a:rPr lang="en-US" dirty="0" smtClean="0"/>
-              <a:t>the resources </a:t>
-            </a:r>
-            <a:r>
-              <a:rPr lang="en-US" dirty="0"/>
-              <a:t>used on the FPGA</a:t>
+              <a:t> 2) for a 4-bit sub-vector of signal</a:t>
             </a:r>
             <a:r>
               <a:rPr lang="en-US" dirty="0" smtClean="0"/>
               <a:t>.</a:t>
             </a:r>
-            <a:endParaRPr lang="en-US" dirty="0"/>
-          </a:p>
-          <a:p>
-            <a:pPr marL="741363" lvl="2" indent="0">
-              <a:buNone/>
-            </a:pPr>
-            <a:endParaRPr lang="en-US" sz="1800" dirty="0" smtClean="0"/>
           </a:p>
         </p:txBody>
       </p:sp>
@@ -10293,7 +10204,7 @@
     </p:spTree>
     <p:extLst>
       <p:ext uri="{BB962C8B-B14F-4D97-AF65-F5344CB8AC3E}">
-        <p14:creationId xmlns:p14="http://schemas.microsoft.com/office/powerpoint/2010/main" val="1376756073"/>
+        <p14:creationId xmlns:p14="http://schemas.microsoft.com/office/powerpoint/2010/main" val="4067556045"/>
       </p:ext>
     </p:extLst>
   </p:cSld>
@@ -10303,177 +10214,7 @@
   <p:timing>
     <p:tnLst>
       <p:par>
-        <p:cTn id="1" dur="indefinite" restart="never" nodeType="tmRoot">
-          <p:childTnLst>
-            <p:seq concurrent="1" nextAc="seek">
-              <p:cTn id="2" dur="indefinite" nodeType="mainSeq">
-                <p:childTnLst>
-                  <p:par>
-                    <p:cTn id="3" fill="hold">
-                      <p:stCondLst>
-                        <p:cond delay="indefinite"/>
-                      </p:stCondLst>
-                      <p:childTnLst>
-                        <p:par>
-                          <p:cTn id="4" fill="hold">
-                            <p:stCondLst>
-                              <p:cond delay="0"/>
-                            </p:stCondLst>
-                            <p:childTnLst>
-                              <p:par>
-                                <p:cTn id="5" presetID="1" presetClass="entr" presetSubtype="0" fill="hold" nodeType="clickEffect">
-                                  <p:stCondLst>
-                                    <p:cond delay="0"/>
-                                  </p:stCondLst>
-                                  <p:childTnLst>
-                                    <p:set>
-                                      <p:cBhvr>
-                                        <p:cTn id="6" dur="1" fill="hold">
-                                          <p:stCondLst>
-                                            <p:cond delay="0"/>
-                                          </p:stCondLst>
-                                        </p:cTn>
-                                        <p:tgtEl>
-                                          <p:spTgt spid="4">
-                                            <p:txEl>
-                                              <p:pRg st="6" end="6"/>
-                                            </p:txEl>
-                                          </p:spTgt>
-                                        </p:tgtEl>
-                                        <p:attrNameLst>
-                                          <p:attrName>style.visibility</p:attrName>
-                                        </p:attrNameLst>
-                                      </p:cBhvr>
-                                      <p:to>
-                                        <p:strVal val="visible"/>
-                                      </p:to>
-                                    </p:set>
-                                  </p:childTnLst>
-                                </p:cTn>
-                              </p:par>
-                            </p:childTnLst>
-                          </p:cTn>
-                        </p:par>
-                      </p:childTnLst>
-                    </p:cTn>
-                  </p:par>
-                  <p:par>
-                    <p:cTn id="7" fill="hold">
-                      <p:stCondLst>
-                        <p:cond delay="indefinite"/>
-                      </p:stCondLst>
-                      <p:childTnLst>
-                        <p:par>
-                          <p:cTn id="8" fill="hold">
-                            <p:stCondLst>
-                              <p:cond delay="0"/>
-                            </p:stCondLst>
-                            <p:childTnLst>
-                              <p:par>
-                                <p:cTn id="9" presetID="1" presetClass="entr" presetSubtype="0" fill="hold" nodeType="clickEffect">
-                                  <p:stCondLst>
-                                    <p:cond delay="0"/>
-                                  </p:stCondLst>
-                                  <p:childTnLst>
-                                    <p:set>
-                                      <p:cBhvr>
-                                        <p:cTn id="10" dur="1" fill="hold">
-                                          <p:stCondLst>
-                                            <p:cond delay="0"/>
-                                          </p:stCondLst>
-                                        </p:cTn>
-                                        <p:tgtEl>
-                                          <p:spTgt spid="4">
-                                            <p:txEl>
-                                              <p:pRg st="7" end="7"/>
-                                            </p:txEl>
-                                          </p:spTgt>
-                                        </p:tgtEl>
-                                        <p:attrNameLst>
-                                          <p:attrName>style.visibility</p:attrName>
-                                        </p:attrNameLst>
-                                      </p:cBhvr>
-                                      <p:to>
-                                        <p:strVal val="visible"/>
-                                      </p:to>
-                                    </p:set>
-                                  </p:childTnLst>
-                                </p:cTn>
-                              </p:par>
-                            </p:childTnLst>
-                          </p:cTn>
-                        </p:par>
-                      </p:childTnLst>
-                    </p:cTn>
-                  </p:par>
-                  <p:par>
-                    <p:cTn id="11" fill="hold">
-                      <p:stCondLst>
-                        <p:cond delay="indefinite"/>
-                      </p:stCondLst>
-                      <p:childTnLst>
-                        <p:par>
-                          <p:cTn id="12" fill="hold">
-                            <p:stCondLst>
-                              <p:cond delay="0"/>
-                            </p:stCondLst>
-                            <p:childTnLst>
-                              <p:par>
-                                <p:cTn id="13" presetID="1" presetClass="entr" presetSubtype="0" fill="hold" nodeType="clickEffect">
-                                  <p:stCondLst>
-                                    <p:cond delay="0"/>
-                                  </p:stCondLst>
-                                  <p:childTnLst>
-                                    <p:set>
-                                      <p:cBhvr>
-                                        <p:cTn id="14" dur="1" fill="hold">
-                                          <p:stCondLst>
-                                            <p:cond delay="0"/>
-                                          </p:stCondLst>
-                                        </p:cTn>
-                                        <p:tgtEl>
-                                          <p:spTgt spid="4">
-                                            <p:txEl>
-                                              <p:pRg st="8" end="8"/>
-                                            </p:txEl>
-                                          </p:spTgt>
-                                        </p:tgtEl>
-                                        <p:attrNameLst>
-                                          <p:attrName>style.visibility</p:attrName>
-                                        </p:attrNameLst>
-                                      </p:cBhvr>
-                                      <p:to>
-                                        <p:strVal val="visible"/>
-                                      </p:to>
-                                    </p:set>
-                                  </p:childTnLst>
-                                </p:cTn>
-                              </p:par>
-                            </p:childTnLst>
-                          </p:cTn>
-                        </p:par>
-                      </p:childTnLst>
-                    </p:cTn>
-                  </p:par>
-                </p:childTnLst>
-              </p:cTn>
-              <p:prevCondLst>
-                <p:cond evt="onPrev" delay="0">
-                  <p:tgtEl>
-                    <p:sldTgt/>
-                  </p:tgtEl>
-                </p:cond>
-              </p:prevCondLst>
-              <p:nextCondLst>
-                <p:cond evt="onNext" delay="0">
-                  <p:tgtEl>
-                    <p:sldTgt/>
-                  </p:tgtEl>
-                </p:cond>
-              </p:nextCondLst>
-            </p:seq>
-          </p:childTnLst>
-        </p:cTn>
+        <p:cTn id="1" dur="indefinite" restart="never" nodeType="tmRoot"/>
       </p:par>
     </p:tnLst>
   </p:timing>
@@ -10545,31 +10286,31 @@
           <a:lstStyle/>
           <a:p>
             <a:r>
+              <a:rPr lang="en-US" dirty="0"/>
+              <a:t>The </a:t>
+            </a:r>
+            <a:r>
+              <a:rPr lang="en-US" dirty="0" err="1"/>
+              <a:t>concatination</a:t>
+            </a:r>
+            <a:r>
+              <a:rPr lang="en-US" dirty="0"/>
+              <a:t> operation, &amp;, is a way to "glue" two vectors together. </a:t>
+            </a:r>
+            <a:endParaRPr lang="en-US" dirty="0" smtClean="0"/>
+          </a:p>
+          <a:p>
+            <a:r>
+              <a:rPr lang="en-US" dirty="0"/>
+              <a:t>F</a:t>
+            </a:r>
+            <a:r>
               <a:rPr lang="en-US" dirty="0" smtClean="0"/>
-              <a:t>There </a:t>
+              <a:t>or </a:t>
             </a:r>
             <a:r>
               <a:rPr lang="en-US" dirty="0"/>
-              <a:t>are times when we will need to rebuild a </a:t>
-            </a:r>
-            <a:r>
-              <a:rPr lang="en-US" dirty="0" err="1"/>
-              <a:t>std_logic_vector</a:t>
-            </a:r>
-            <a:r>
-              <a:rPr lang="en-US" dirty="0"/>
-              <a:t> from pieces of other vectors. </a:t>
-            </a:r>
-            <a:endParaRPr lang="en-US" dirty="0" smtClean="0"/>
-          </a:p>
-          <a:p>
-            <a:r>
-              <a:rPr lang="en-US" dirty="0" smtClean="0"/>
-              <a:t>Vector is defined </a:t>
-            </a:r>
-            <a:r>
-              <a:rPr lang="en-US" dirty="0"/>
-              <a:t>as signal(7 </a:t>
+              <a:t>example, to build a 8-bit vector you could legally write in VHDL signal(3 </a:t>
             </a:r>
             <a:r>
               <a:rPr lang="en-US" dirty="0" err="1"/>
@@ -10577,22 +10318,7 @@
             </a:r>
             <a:r>
               <a:rPr lang="en-US" dirty="0"/>
-              <a:t> 0), you can replace the limits with anything in between to get a small </a:t>
-            </a:r>
-            <a:r>
-              <a:rPr lang="en-US" dirty="0" err="1" smtClean="0"/>
-              <a:t>subvector</a:t>
-            </a:r>
-            <a:endParaRPr lang="en-US" dirty="0"/>
-          </a:p>
-          <a:p>
-            <a:r>
-              <a:rPr lang="en-US" dirty="0" smtClean="0"/>
-              <a:t>For example</a:t>
-            </a:r>
-            <a:r>
-              <a:rPr lang="en-US" dirty="0"/>
-              <a:t>, you could ask for signal(5 </a:t>
+              <a:t> 1) &amp; signal (7 </a:t>
             </a:r>
             <a:r>
               <a:rPr lang="en-US" dirty="0" err="1"/>
@@ -10600,12 +10326,80 @@
             </a:r>
             <a:r>
               <a:rPr lang="en-US" dirty="0"/>
-              <a:t> 2) for a 4-bit sub-vector of signal</a:t>
+              <a:t> 3);</a:t>
+            </a:r>
+          </a:p>
+          <a:p>
+            <a:r>
+              <a:rPr lang="en-US" dirty="0"/>
+              <a:t>These two concepts come together in the shift register used in the lecture 11 </a:t>
+            </a:r>
+            <a:r>
+              <a:rPr lang="en-US" dirty="0" smtClean="0"/>
+              <a:t>code, which </a:t>
+            </a:r>
+            <a:r>
+              <a:rPr lang="en-US" dirty="0"/>
+              <a:t>contains the following line of VHDL code</a:t>
             </a:r>
             <a:r>
               <a:rPr lang="en-US" dirty="0" smtClean="0"/>
               <a:t>.</a:t>
             </a:r>
+          </a:p>
+          <a:p>
+            <a:pPr marL="741363" lvl="2" indent="0">
+              <a:buNone/>
+            </a:pPr>
+            <a:endParaRPr lang="en-US" sz="1800" dirty="0" smtClean="0"/>
+          </a:p>
+          <a:p>
+            <a:pPr marL="741363" lvl="2" indent="0">
+              <a:buNone/>
+            </a:pPr>
+            <a:r>
+              <a:rPr lang="en-US" sz="1800" dirty="0" err="1" smtClean="0"/>
+              <a:t>shiftReg</a:t>
+            </a:r>
+            <a:r>
+              <a:rPr lang="en-US" sz="1800" dirty="0" smtClean="0"/>
+              <a:t> </a:t>
+            </a:r>
+            <a:r>
+              <a:rPr lang="en-US" sz="1800" dirty="0"/>
+              <a:t>&lt;= </a:t>
+            </a:r>
+            <a:r>
+              <a:rPr lang="en-US" sz="1800" dirty="0" err="1"/>
+              <a:t>kbData</a:t>
+            </a:r>
+            <a:r>
+              <a:rPr lang="en-US" sz="1800" dirty="0"/>
+              <a:t> &amp; </a:t>
+            </a:r>
+            <a:r>
+              <a:rPr lang="en-US" sz="1800" dirty="0" err="1"/>
+              <a:t>shiftReg</a:t>
+            </a:r>
+            <a:r>
+              <a:rPr lang="en-US" sz="1800" dirty="0"/>
+              <a:t> (10 </a:t>
+            </a:r>
+            <a:r>
+              <a:rPr lang="en-US" sz="1800" dirty="0" err="1"/>
+              <a:t>downto</a:t>
+            </a:r>
+            <a:r>
+              <a:rPr lang="en-US" sz="1800" dirty="0"/>
+              <a:t> 1); </a:t>
+            </a:r>
+            <a:endParaRPr lang="en-US" sz="1800" dirty="0" smtClean="0"/>
+          </a:p>
+          <a:p>
+            <a:pPr marL="741363" lvl="2" indent="0">
+              <a:buNone/>
+            </a:pPr>
+            <a:endParaRPr lang="en-US" sz="1800" dirty="0" smtClean="0"/>
           </a:p>
         </p:txBody>
       </p:sp>
@@ -10654,7 +10448,7 @@
     </p:spTree>
     <p:extLst>
       <p:ext uri="{BB962C8B-B14F-4D97-AF65-F5344CB8AC3E}">
-        <p14:creationId xmlns:p14="http://schemas.microsoft.com/office/powerpoint/2010/main" val="4067556045"/>
+        <p14:creationId xmlns:p14="http://schemas.microsoft.com/office/powerpoint/2010/main" val="3567975975"/>
       </p:ext>
     </p:extLst>
   </p:cSld>
@@ -10690,7 +10484,7 @@
       </p:grpSpPr>
       <p:sp>
         <p:nvSpPr>
-          <p:cNvPr id="2" name="Title 1"/>
+          <p:cNvPr id="6" name="Title 5"/>
           <p:cNvSpPr>
             <a:spLocks noGrp="1"/>
           </p:cNvSpPr>
@@ -10704,158 +10498,35 @@
           <a:lstStyle/>
           <a:p>
             <a:r>
-              <a:rPr lang="en-US" dirty="0" err="1" smtClean="0"/>
-              <a:t>Subvectors</a:t>
-            </a:r>
-            <a:r>
-              <a:rPr lang="en-US" dirty="0" smtClean="0"/>
-              <a:t> and Concatenation</a:t>
-            </a:r>
-            <a:endParaRPr lang="en-US" dirty="0"/>
-          </a:p>
-        </p:txBody>
-      </p:sp>
-      <p:sp>
-        <p:nvSpPr>
-          <p:cNvPr id="4" name="Content Placeholder 3"/>
+              <a:rPr lang="en-US" cap="none" dirty="0" smtClean="0"/>
+              <a:t>Keyboard Serial to Parallel Converter</a:t>
+            </a:r>
+            <a:endParaRPr lang="en-US" cap="none" dirty="0"/>
+          </a:p>
+        </p:txBody>
+      </p:sp>
+      <p:sp>
+        <p:nvSpPr>
+          <p:cNvPr id="7" name="Text Placeholder 6"/>
           <p:cNvSpPr>
             <a:spLocks noGrp="1"/>
           </p:cNvSpPr>
           <p:nvPr>
-            <p:ph idx="1"/>
-          </p:nvPr>
-        </p:nvSpPr>
-        <p:spPr>
-          <a:xfrm>
-            <a:off x="581736" y="1523052"/>
-            <a:ext cx="8131175" cy="4324350"/>
-          </a:xfrm>
-        </p:spPr>
+            <p:ph type="body" idx="1"/>
+          </p:nvPr>
+        </p:nvSpPr>
+        <p:spPr/>
         <p:txBody>
           <a:bodyPr/>
           <a:lstStyle/>
           <a:p>
-            <a:r>
-              <a:rPr lang="en-US" dirty="0"/>
-              <a:t>The </a:t>
-            </a:r>
-            <a:r>
-              <a:rPr lang="en-US" dirty="0" err="1"/>
-              <a:t>concatination</a:t>
-            </a:r>
-            <a:r>
-              <a:rPr lang="en-US" dirty="0"/>
-              <a:t> operation, &amp;, is a way to "glue" two vectors together. </a:t>
-            </a:r>
-            <a:endParaRPr lang="en-US" dirty="0" smtClean="0"/>
-          </a:p>
-          <a:p>
-            <a:r>
-              <a:rPr lang="en-US" dirty="0"/>
-              <a:t>F</a:t>
-            </a:r>
-            <a:r>
-              <a:rPr lang="en-US" dirty="0" smtClean="0"/>
-              <a:t>or </a:t>
-            </a:r>
-            <a:r>
-              <a:rPr lang="en-US" dirty="0"/>
-              <a:t>example, to build a 8-bit vector you could legally write in VHDL signal(3 </a:t>
-            </a:r>
-            <a:r>
-              <a:rPr lang="en-US" dirty="0" err="1"/>
-              <a:t>downto</a:t>
-            </a:r>
-            <a:r>
-              <a:rPr lang="en-US" dirty="0"/>
-              <a:t> 1) &amp; signal (7 </a:t>
-            </a:r>
-            <a:r>
-              <a:rPr lang="en-US" dirty="0" err="1"/>
-              <a:t>downto</a:t>
-            </a:r>
-            <a:r>
-              <a:rPr lang="en-US" dirty="0"/>
-              <a:t> 3);</a:t>
-            </a:r>
-          </a:p>
-          <a:p>
-            <a:r>
-              <a:rPr lang="en-US" dirty="0"/>
-              <a:t>These two concepts come together in the shift register used in the lecture 11 </a:t>
-            </a:r>
-            <a:r>
-              <a:rPr lang="en-US" dirty="0" smtClean="0"/>
-              <a:t>code, which </a:t>
-            </a:r>
-            <a:r>
-              <a:rPr lang="en-US" dirty="0"/>
-              <a:t>contains the following line of VHDL code</a:t>
-            </a:r>
-            <a:r>
-              <a:rPr lang="en-US" dirty="0" smtClean="0"/>
-              <a:t>.</a:t>
-            </a:r>
-          </a:p>
-          <a:p>
-            <a:pPr marL="741363" lvl="2" indent="0">
-              <a:buNone/>
-            </a:pPr>
-            <a:endParaRPr lang="en-US" sz="1800" dirty="0" smtClean="0"/>
-          </a:p>
-          <a:p>
-            <a:pPr marL="741363" lvl="2" indent="0">
-              <a:buNone/>
-            </a:pPr>
-            <a:r>
-              <a:rPr lang="en-US" sz="1800" dirty="0" err="1" smtClean="0"/>
-              <a:t>shiftReg</a:t>
-            </a:r>
-            <a:r>
-              <a:rPr lang="en-US" sz="1800" dirty="0" smtClean="0"/>
-              <a:t> </a:t>
-            </a:r>
-            <a:r>
-              <a:rPr lang="en-US" sz="1800" dirty="0"/>
-              <a:t>&lt;= </a:t>
-            </a:r>
-            <a:r>
-              <a:rPr lang="en-US" sz="1800" dirty="0" err="1"/>
-              <a:t>kbData</a:t>
-            </a:r>
-            <a:r>
-              <a:rPr lang="en-US" sz="1800" dirty="0"/>
-              <a:t> &amp; </a:t>
-            </a:r>
-            <a:r>
-              <a:rPr lang="en-US" sz="1800" dirty="0" err="1"/>
-              <a:t>shiftReg</a:t>
-            </a:r>
-            <a:r>
-              <a:rPr lang="en-US" sz="1800" dirty="0"/>
-              <a:t> (10 </a:t>
-            </a:r>
-            <a:r>
-              <a:rPr lang="en-US" sz="1800" dirty="0" err="1"/>
-              <a:t>downto</a:t>
-            </a:r>
-            <a:r>
-              <a:rPr lang="en-US" sz="1800" dirty="0"/>
-              <a:t> 1); </a:t>
-            </a:r>
-            <a:endParaRPr lang="en-US" sz="1800" dirty="0" smtClean="0"/>
-          </a:p>
-          <a:p>
-            <a:pPr marL="741363" lvl="2" indent="0">
-              <a:buNone/>
-            </a:pPr>
-            <a:endParaRPr lang="en-US" sz="1800" dirty="0" smtClean="0"/>
-          </a:p>
-        </p:txBody>
-      </p:sp>
-      <p:sp>
-        <p:nvSpPr>
-          <p:cNvPr id="5" name="Slide Number Placeholder 3"/>
+            <a:endParaRPr lang="en-US" dirty="0"/>
+          </a:p>
+        </p:txBody>
+      </p:sp>
+      <p:sp>
+        <p:nvSpPr>
+          <p:cNvPr id="4" name="Slide Number Placeholder 3"/>
           <p:cNvSpPr>
             <a:spLocks noGrp="1"/>
           </p:cNvSpPr>
@@ -10863,12 +10534,7 @@
             <p:ph type="sldNum" sz="quarter" idx="10"/>
           </p:nvPr>
         </p:nvSpPr>
-        <p:spPr>
-          <a:xfrm>
-            <a:off x="6910388" y="6253163"/>
-            <a:ext cx="2133600" cy="476250"/>
-          </a:xfrm>
-        </p:spPr>
+        <p:spPr/>
         <p:txBody>
           <a:bodyPr/>
           <a:lstStyle/>
@@ -10886,122 +10552,6 @@
                 <a:defRPr/>
               </a:pPr>
               <a:t>15</a:t>
-            </a:fld>
-            <a:endParaRPr lang="en-US" dirty="0">
-              <a:solidFill>
-                <a:srgbClr val="000000"/>
-              </a:solidFill>
-            </a:endParaRPr>
-          </a:p>
-        </p:txBody>
-      </p:sp>
-    </p:spTree>
-    <p:extLst>
-      <p:ext uri="{BB962C8B-B14F-4D97-AF65-F5344CB8AC3E}">
-        <p14:creationId xmlns:p14="http://schemas.microsoft.com/office/powerpoint/2010/main" val="3567975975"/>
-      </p:ext>
-    </p:extLst>
-  </p:cSld>
-  <p:clrMapOvr>
-    <a:masterClrMapping/>
-  </p:clrMapOvr>
-  <p:timing>
-    <p:tnLst>
-      <p:par>
-        <p:cTn id="1" dur="indefinite" restart="never" nodeType="tmRoot"/>
-      </p:par>
-    </p:tnLst>
-  </p:timing>
-</p:sld>
-</file>
-
-<file path=ppt/slides/slide16.xml><?xml version="1.0" encoding="utf-8"?>
-<p:sld xmlns:a="http://schemas.openxmlformats.org/drawingml/2006/main" xmlns:r="http://schemas.openxmlformats.org/officeDocument/2006/relationships" xmlns:p="http://schemas.openxmlformats.org/presentationml/2006/main">
-  <p:cSld>
-    <p:spTree>
-      <p:nvGrpSpPr>
-        <p:cNvPr id="1" name=""/>
-        <p:cNvGrpSpPr/>
-        <p:nvPr/>
-      </p:nvGrpSpPr>
-      <p:grpSpPr>
-        <a:xfrm>
-          <a:off x="0" y="0"/>
-          <a:ext cx="0" cy="0"/>
-          <a:chOff x="0" y="0"/>
-          <a:chExt cx="0" cy="0"/>
-        </a:xfrm>
-      </p:grpSpPr>
-      <p:sp>
-        <p:nvSpPr>
-          <p:cNvPr id="6" name="Title 5"/>
-          <p:cNvSpPr>
-            <a:spLocks noGrp="1"/>
-          </p:cNvSpPr>
-          <p:nvPr>
-            <p:ph type="title"/>
-          </p:nvPr>
-        </p:nvSpPr>
-        <p:spPr/>
-        <p:txBody>
-          <a:bodyPr/>
-          <a:lstStyle/>
-          <a:p>
-            <a:r>
-              <a:rPr lang="en-US" cap="none" dirty="0" smtClean="0"/>
-              <a:t>Keyboard Serial to Parallel Converter</a:t>
-            </a:r>
-            <a:endParaRPr lang="en-US" cap="none" dirty="0"/>
-          </a:p>
-        </p:txBody>
-      </p:sp>
-      <p:sp>
-        <p:nvSpPr>
-          <p:cNvPr id="7" name="Text Placeholder 6"/>
-          <p:cNvSpPr>
-            <a:spLocks noGrp="1"/>
-          </p:cNvSpPr>
-          <p:nvPr>
-            <p:ph type="body" idx="1"/>
-          </p:nvPr>
-        </p:nvSpPr>
-        <p:spPr/>
-        <p:txBody>
-          <a:bodyPr/>
-          <a:lstStyle/>
-          <a:p>
-            <a:endParaRPr lang="en-US" dirty="0"/>
-          </a:p>
-        </p:txBody>
-      </p:sp>
-      <p:sp>
-        <p:nvSpPr>
-          <p:cNvPr id="4" name="Slide Number Placeholder 3"/>
-          <p:cNvSpPr>
-            <a:spLocks noGrp="1"/>
-          </p:cNvSpPr>
-          <p:nvPr>
-            <p:ph type="sldNum" sz="quarter" idx="10"/>
-          </p:nvPr>
-        </p:nvSpPr>
-        <p:spPr/>
-        <p:txBody>
-          <a:bodyPr/>
-          <a:lstStyle/>
-          <a:p>
-            <a:pPr>
-              <a:defRPr/>
-            </a:pPr>
-            <a:fld id="{62D6D4B2-7611-498F-8780-1EDC26277454}" type="slidenum">
-              <a:rPr lang="en-US" smtClean="0">
-                <a:solidFill>
-                  <a:srgbClr val="000000"/>
-                </a:solidFill>
-              </a:rPr>
-              <a:pPr>
-                <a:defRPr/>
-              </a:pPr>
-              <a:t>16</a:t>
             </a:fld>
             <a:endParaRPr lang="en-US" dirty="0">
               <a:solidFill>
@@ -11031,7 +10581,7 @@
 </p:sld>
 </file>
 
-<file path=ppt/slides/slide17.xml><?xml version="1.0" encoding="utf-8"?>
+<file path=ppt/slides/slide16.xml><?xml version="1.0" encoding="utf-8"?>
 <p:sld xmlns:a="http://schemas.openxmlformats.org/drawingml/2006/main" xmlns:r="http://schemas.openxmlformats.org/officeDocument/2006/relationships" xmlns:p="http://schemas.openxmlformats.org/presentationml/2006/main">
   <p:cSld>
     <p:spTree>
@@ -12172,7 +11722,7 @@
               <a:pPr>
                 <a:defRPr/>
               </a:pPr>
-              <a:t>17</a:t>
+              <a:t>16</a:t>
             </a:fld>
             <a:endParaRPr lang="en-US" dirty="0">
               <a:solidFill>
@@ -12202,7 +11752,7 @@
 </p:sld>
 </file>
 
-<file path=ppt/slides/slide18.xml><?xml version="1.0" encoding="utf-8"?>
+<file path=ppt/slides/slide17.xml><?xml version="1.0" encoding="utf-8"?>
 <p:sld xmlns:a="http://schemas.openxmlformats.org/drawingml/2006/main" xmlns:r="http://schemas.openxmlformats.org/officeDocument/2006/relationships" xmlns:p="http://schemas.openxmlformats.org/presentationml/2006/main">
   <p:cSld>
     <p:spTree>
@@ -12298,7 +11848,7 @@
               <a:pPr>
                 <a:defRPr/>
               </a:pPr>
-              <a:t>18</a:t>
+              <a:t>17</a:t>
             </a:fld>
             <a:endParaRPr lang="en-US" dirty="0">
               <a:solidFill>
@@ -12369,7 +11919,7 @@
 </p:sld>
 </file>
 
-<file path=ppt/slides/slide19.xml><?xml version="1.0" encoding="utf-8"?>
+<file path=ppt/slides/slide18.xml><?xml version="1.0" encoding="utf-8"?>
 <p:sld xmlns:a="http://schemas.openxmlformats.org/drawingml/2006/main" xmlns:r="http://schemas.openxmlformats.org/officeDocument/2006/relationships" xmlns:p="http://schemas.openxmlformats.org/presentationml/2006/main">
   <p:cSld>
     <p:spTree>
@@ -13394,7 +12944,7 @@
               <a:pPr>
                 <a:defRPr/>
               </a:pPr>
-              <a:t>19</a:t>
+              <a:t>18</a:t>
             </a:fld>
             <a:endParaRPr lang="en-US" dirty="0">
               <a:solidFill>
@@ -13424,7 +12974,7 @@
 </p:sld>
 </file>
 
-<file path=ppt/slides/slide2.xml><?xml version="1.0" encoding="utf-8"?>
+<file path=ppt/slides/slide19.xml><?xml version="1.0" encoding="utf-8"?>
 <p:sld xmlns:a="http://schemas.openxmlformats.org/drawingml/2006/main" xmlns:r="http://schemas.openxmlformats.org/officeDocument/2006/relationships" xmlns:p="http://schemas.openxmlformats.org/presentationml/2006/main">
   <p:cSld>
     <p:spTree>
@@ -13457,8 +13007,8 @@
           <a:lstStyle/>
           <a:p>
             <a:r>
-              <a:rPr lang="en-US" dirty="0" smtClean="0"/>
-              <a:t>Lesson Outline</a:t>
+              <a:rPr lang="en-US" dirty="0"/>
+              <a:t>Unused outputs and open keyword</a:t>
             </a:r>
             <a:endParaRPr lang="en-US" dirty="0"/>
           </a:p>
@@ -13474,66 +13024,170 @@
             <p:ph idx="1"/>
           </p:nvPr>
         </p:nvSpPr>
-        <p:spPr/>
+        <p:spPr>
+          <a:xfrm>
+            <a:off x="581736" y="1523052"/>
+            <a:ext cx="8131175" cy="4324350"/>
+          </a:xfrm>
+        </p:spPr>
         <p:txBody>
           <a:bodyPr/>
           <a:lstStyle/>
           <a:p>
-            <a:pPr eaLnBrk="1" hangingPunct="1">
-              <a:lnSpc>
-                <a:spcPct val="80000"/>
-              </a:lnSpc>
+            <a:r>
+              <a:rPr lang="en-US" dirty="0"/>
+              <a:t>Looking at the timing diagram and the description </a:t>
+            </a:r>
+            <a:r>
+              <a:rPr lang="en-US" dirty="0" smtClean="0"/>
+              <a:t>on previous slide, we get the </a:t>
+            </a:r>
+            <a:r>
+              <a:rPr lang="en-US" dirty="0"/>
+              <a:t>following algorithm.</a:t>
+            </a:r>
+            <a:endParaRPr lang="en-US" dirty="0" smtClean="0"/>
+          </a:p>
+          <a:p>
+            <a:pPr marL="741363" lvl="2" indent="0">
+              <a:buNone/>
             </a:pPr>
             <a:r>
-              <a:rPr lang="en-US" dirty="0" smtClean="0"/>
-              <a:t>Time Logs!</a:t>
-            </a:r>
-          </a:p>
-          <a:p>
-            <a:pPr eaLnBrk="1" hangingPunct="1">
-              <a:lnSpc>
-                <a:spcPct val="80000"/>
-              </a:lnSpc>
+              <a:rPr lang="en-US" sz="1800" dirty="0"/>
+              <a:t>1. while(1) {</a:t>
+            </a:r>
+          </a:p>
+          <a:p>
+            <a:pPr marL="741363" lvl="2" indent="0">
+              <a:buNone/>
             </a:pPr>
             <a:r>
-              <a:rPr lang="en-US" dirty="0" err="1" smtClean="0"/>
-              <a:t>Datapath</a:t>
-            </a:r>
-            <a:r>
-              <a:rPr lang="en-US" dirty="0" smtClean="0"/>
-              <a:t> </a:t>
-            </a:r>
-            <a:r>
-              <a:rPr lang="en-US" dirty="0" smtClean="0"/>
-              <a:t>and </a:t>
-            </a:r>
-            <a:r>
-              <a:rPr lang="en-US" dirty="0" smtClean="0"/>
-              <a:t>Control – Timing</a:t>
-            </a:r>
-          </a:p>
-          <a:p>
-            <a:pPr eaLnBrk="1" hangingPunct="1">
-              <a:lnSpc>
-                <a:spcPct val="80000"/>
-              </a:lnSpc>
+              <a:rPr lang="en-US" sz="1800" dirty="0"/>
+              <a:t>2.     busy=0;</a:t>
+            </a:r>
+          </a:p>
+          <a:p>
+            <a:pPr marL="741363" lvl="2" indent="0">
+              <a:buNone/>
             </a:pPr>
             <a:r>
-              <a:rPr lang="en-US" dirty="0" smtClean="0"/>
-              <a:t>VHDL Instantiation</a:t>
-            </a:r>
-          </a:p>
-          <a:p>
-            <a:pPr eaLnBrk="1" hangingPunct="1">
-              <a:lnSpc>
-                <a:spcPct val="80000"/>
-              </a:lnSpc>
+              <a:rPr lang="en-US" sz="1800" dirty="0"/>
+              <a:t>3.     while (</a:t>
+            </a:r>
+            <a:r>
+              <a:rPr lang="en-US" sz="1800" dirty="0" err="1"/>
+              <a:t>kb_clk</a:t>
+            </a:r>
+            <a:r>
+              <a:rPr lang="en-US" sz="1800" dirty="0"/>
+              <a:t> == 1);</a:t>
+            </a:r>
+          </a:p>
+          <a:p>
+            <a:pPr marL="741363" lvl="2" indent="0">
+              <a:buNone/>
             </a:pPr>
             <a:r>
-              <a:rPr lang="en-US" dirty="0" smtClean="0"/>
-              <a:t>Keyboard serial to parallel converter</a:t>
-            </a:r>
-            <a:endParaRPr lang="en-US" dirty="0" smtClean="0"/>
+              <a:rPr lang="en-US" sz="1800" dirty="0"/>
+              <a:t>4.     busy=1;</a:t>
+            </a:r>
+          </a:p>
+          <a:p>
+            <a:pPr marL="741363" lvl="2" indent="0">
+              <a:buNone/>
+            </a:pPr>
+            <a:r>
+              <a:rPr lang="en-US" sz="1800" dirty="0"/>
+              <a:t>5.     for (count=0 count&lt;33; count++) {</a:t>
+            </a:r>
+          </a:p>
+          <a:p>
+            <a:pPr marL="741363" lvl="2" indent="0">
+              <a:buNone/>
+            </a:pPr>
+            <a:r>
+              <a:rPr lang="en-US" sz="1800" dirty="0"/>
+              <a:t>6.         while(</a:t>
+            </a:r>
+            <a:r>
+              <a:rPr lang="en-US" sz="1800" dirty="0" err="1"/>
+              <a:t>kb_clk</a:t>
+            </a:r>
+            <a:r>
+              <a:rPr lang="en-US" sz="1800" dirty="0"/>
+              <a:t> == 1);</a:t>
+            </a:r>
+          </a:p>
+          <a:p>
+            <a:pPr marL="741363" lvl="2" indent="0">
+              <a:buNone/>
+            </a:pPr>
+            <a:r>
+              <a:rPr lang="en-US" sz="1800" dirty="0"/>
+              <a:t>7.         shift = (shift &lt;&lt; 1) | </a:t>
+            </a:r>
+            <a:r>
+              <a:rPr lang="en-US" sz="1800" dirty="0" err="1"/>
+              <a:t>kb_data</a:t>
+            </a:r>
+            <a:r>
+              <a:rPr lang="en-US" sz="1800" dirty="0"/>
+              <a:t>;</a:t>
+            </a:r>
+          </a:p>
+          <a:p>
+            <a:pPr marL="741363" lvl="2" indent="0">
+              <a:buNone/>
+            </a:pPr>
+            <a:r>
+              <a:rPr lang="en-US" sz="1800" dirty="0"/>
+              <a:t>8.         while(</a:t>
+            </a:r>
+            <a:r>
+              <a:rPr lang="en-US" sz="1800" dirty="0" err="1"/>
+              <a:t>kb_clk</a:t>
+            </a:r>
+            <a:r>
+              <a:rPr lang="en-US" sz="1800" dirty="0"/>
+              <a:t> == 0);</a:t>
+            </a:r>
+          </a:p>
+          <a:p>
+            <a:pPr marL="741363" lvl="2" indent="0">
+              <a:buNone/>
+            </a:pPr>
+            <a:r>
+              <a:rPr lang="en-US" sz="1800" dirty="0"/>
+              <a:t>9.     } // end for</a:t>
+            </a:r>
+          </a:p>
+          <a:p>
+            <a:pPr marL="741363" lvl="2" indent="0">
+              <a:buNone/>
+            </a:pPr>
+            <a:r>
+              <a:rPr lang="en-US" sz="1800" dirty="0"/>
+              <a:t>10.     scan = shift[9-2]</a:t>
+            </a:r>
+          </a:p>
+          <a:p>
+            <a:pPr marL="741363" lvl="2" indent="0">
+              <a:buNone/>
+            </a:pPr>
+            <a:r>
+              <a:rPr lang="en-US" sz="1800" dirty="0"/>
+              <a:t>11. } // end while </a:t>
+            </a:r>
+            <a:r>
+              <a:rPr lang="en-US" sz="1800" dirty="0" smtClean="0"/>
+              <a:t>1</a:t>
+            </a:r>
+          </a:p>
+          <a:p>
+            <a:pPr marL="741363" lvl="2" indent="0">
+              <a:buNone/>
+            </a:pPr>
+            <a:endParaRPr lang="en-US" sz="1800" dirty="0" smtClean="0"/>
           </a:p>
         </p:txBody>
       </p:sp>
@@ -13569,286 +13223,7 @@
               <a:pPr>
                 <a:defRPr/>
               </a:pPr>
-              <a:t>2</a:t>
-            </a:fld>
-            <a:endParaRPr lang="en-US" dirty="0">
-              <a:solidFill>
-                <a:srgbClr val="000000"/>
-              </a:solidFill>
-            </a:endParaRPr>
-          </a:p>
-        </p:txBody>
-      </p:sp>
-    </p:spTree>
-    <p:extLst>
-      <p:ext uri="{BB962C8B-B14F-4D97-AF65-F5344CB8AC3E}">
-        <p14:creationId xmlns:p14="http://schemas.microsoft.com/office/powerpoint/2010/main" val="3991601210"/>
-      </p:ext>
-    </p:extLst>
-  </p:cSld>
-  <p:clrMapOvr>
-    <a:masterClrMapping/>
-  </p:clrMapOvr>
-  <p:timing>
-    <p:tnLst>
-      <p:par>
-        <p:cTn id="1" dur="indefinite" restart="never" nodeType="tmRoot"/>
-      </p:par>
-    </p:tnLst>
-  </p:timing>
-</p:sld>
-</file>
-
-<file path=ppt/slides/slide20.xml><?xml version="1.0" encoding="utf-8"?>
-<p:sld xmlns:a="http://schemas.openxmlformats.org/drawingml/2006/main" xmlns:r="http://schemas.openxmlformats.org/officeDocument/2006/relationships" xmlns:p="http://schemas.openxmlformats.org/presentationml/2006/main">
-  <p:cSld>
-    <p:spTree>
-      <p:nvGrpSpPr>
-        <p:cNvPr id="1" name=""/>
-        <p:cNvGrpSpPr/>
-        <p:nvPr/>
-      </p:nvGrpSpPr>
-      <p:grpSpPr>
-        <a:xfrm>
-          <a:off x="0" y="0"/>
-          <a:ext cx="0" cy="0"/>
-          <a:chOff x="0" y="0"/>
-          <a:chExt cx="0" cy="0"/>
-        </a:xfrm>
-      </p:grpSpPr>
-      <p:sp>
-        <p:nvSpPr>
-          <p:cNvPr id="2" name="Title 1"/>
-          <p:cNvSpPr>
-            <a:spLocks noGrp="1"/>
-          </p:cNvSpPr>
-          <p:nvPr>
-            <p:ph type="title"/>
-          </p:nvPr>
-        </p:nvSpPr>
-        <p:spPr/>
-        <p:txBody>
-          <a:bodyPr/>
-          <a:lstStyle/>
-          <a:p>
-            <a:r>
-              <a:rPr lang="en-US" dirty="0"/>
-              <a:t>Unused outputs and open keyword</a:t>
-            </a:r>
-            <a:endParaRPr lang="en-US" dirty="0"/>
-          </a:p>
-        </p:txBody>
-      </p:sp>
-      <p:sp>
-        <p:nvSpPr>
-          <p:cNvPr id="4" name="Content Placeholder 3"/>
-          <p:cNvSpPr>
-            <a:spLocks noGrp="1"/>
-          </p:cNvSpPr>
-          <p:nvPr>
-            <p:ph idx="1"/>
-          </p:nvPr>
-        </p:nvSpPr>
-        <p:spPr>
-          <a:xfrm>
-            <a:off x="581736" y="1523052"/>
-            <a:ext cx="8131175" cy="4324350"/>
-          </a:xfrm>
-        </p:spPr>
-        <p:txBody>
-          <a:bodyPr/>
-          <a:lstStyle/>
-          <a:p>
-            <a:r>
-              <a:rPr lang="en-US" dirty="0"/>
-              <a:t>Looking at the timing diagram and the description </a:t>
-            </a:r>
-            <a:r>
-              <a:rPr lang="en-US" dirty="0" smtClean="0"/>
-              <a:t>on previous slide, we get the </a:t>
-            </a:r>
-            <a:r>
-              <a:rPr lang="en-US" dirty="0"/>
-              <a:t>following algorithm.</a:t>
-            </a:r>
-            <a:endParaRPr lang="en-US" dirty="0" smtClean="0"/>
-          </a:p>
-          <a:p>
-            <a:pPr marL="741363" lvl="2" indent="0">
-              <a:buNone/>
-            </a:pPr>
-            <a:r>
-              <a:rPr lang="en-US" sz="1800" dirty="0"/>
-              <a:t>1. while(1) {</a:t>
-            </a:r>
-          </a:p>
-          <a:p>
-            <a:pPr marL="741363" lvl="2" indent="0">
-              <a:buNone/>
-            </a:pPr>
-            <a:r>
-              <a:rPr lang="en-US" sz="1800" dirty="0"/>
-              <a:t>2.     busy=0;</a:t>
-            </a:r>
-          </a:p>
-          <a:p>
-            <a:pPr marL="741363" lvl="2" indent="0">
-              <a:buNone/>
-            </a:pPr>
-            <a:r>
-              <a:rPr lang="en-US" sz="1800" dirty="0"/>
-              <a:t>3.     while (</a:t>
-            </a:r>
-            <a:r>
-              <a:rPr lang="en-US" sz="1800" dirty="0" err="1"/>
-              <a:t>kb_clk</a:t>
-            </a:r>
-            <a:r>
-              <a:rPr lang="en-US" sz="1800" dirty="0"/>
-              <a:t> == 1);</a:t>
-            </a:r>
-          </a:p>
-          <a:p>
-            <a:pPr marL="741363" lvl="2" indent="0">
-              <a:buNone/>
-            </a:pPr>
-            <a:r>
-              <a:rPr lang="en-US" sz="1800" dirty="0"/>
-              <a:t>4.     busy=1;</a:t>
-            </a:r>
-          </a:p>
-          <a:p>
-            <a:pPr marL="741363" lvl="2" indent="0">
-              <a:buNone/>
-            </a:pPr>
-            <a:r>
-              <a:rPr lang="en-US" sz="1800" dirty="0"/>
-              <a:t>5.     for (count=0 count&lt;33; count++) {</a:t>
-            </a:r>
-          </a:p>
-          <a:p>
-            <a:pPr marL="741363" lvl="2" indent="0">
-              <a:buNone/>
-            </a:pPr>
-            <a:r>
-              <a:rPr lang="en-US" sz="1800" dirty="0"/>
-              <a:t>6.         while(</a:t>
-            </a:r>
-            <a:r>
-              <a:rPr lang="en-US" sz="1800" dirty="0" err="1"/>
-              <a:t>kb_clk</a:t>
-            </a:r>
-            <a:r>
-              <a:rPr lang="en-US" sz="1800" dirty="0"/>
-              <a:t> == 1);</a:t>
-            </a:r>
-          </a:p>
-          <a:p>
-            <a:pPr marL="741363" lvl="2" indent="0">
-              <a:buNone/>
-            </a:pPr>
-            <a:r>
-              <a:rPr lang="en-US" sz="1800" dirty="0"/>
-              <a:t>7.         shift = (shift &lt;&lt; 1) | </a:t>
-            </a:r>
-            <a:r>
-              <a:rPr lang="en-US" sz="1800" dirty="0" err="1"/>
-              <a:t>kb_data</a:t>
-            </a:r>
-            <a:r>
-              <a:rPr lang="en-US" sz="1800" dirty="0"/>
-              <a:t>;</a:t>
-            </a:r>
-          </a:p>
-          <a:p>
-            <a:pPr marL="741363" lvl="2" indent="0">
-              <a:buNone/>
-            </a:pPr>
-            <a:r>
-              <a:rPr lang="en-US" sz="1800" dirty="0"/>
-              <a:t>8.         while(</a:t>
-            </a:r>
-            <a:r>
-              <a:rPr lang="en-US" sz="1800" dirty="0" err="1"/>
-              <a:t>kb_clk</a:t>
-            </a:r>
-            <a:r>
-              <a:rPr lang="en-US" sz="1800" dirty="0"/>
-              <a:t> == 0);</a:t>
-            </a:r>
-          </a:p>
-          <a:p>
-            <a:pPr marL="741363" lvl="2" indent="0">
-              <a:buNone/>
-            </a:pPr>
-            <a:r>
-              <a:rPr lang="en-US" sz="1800" dirty="0"/>
-              <a:t>9.     } // end for</a:t>
-            </a:r>
-          </a:p>
-          <a:p>
-            <a:pPr marL="741363" lvl="2" indent="0">
-              <a:buNone/>
-            </a:pPr>
-            <a:r>
-              <a:rPr lang="en-US" sz="1800" dirty="0"/>
-              <a:t>10.     scan = shift[9-2]</a:t>
-            </a:r>
-          </a:p>
-          <a:p>
-            <a:pPr marL="741363" lvl="2" indent="0">
-              <a:buNone/>
-            </a:pPr>
-            <a:r>
-              <a:rPr lang="en-US" sz="1800" dirty="0"/>
-              <a:t>11. } // end while </a:t>
-            </a:r>
-            <a:r>
-              <a:rPr lang="en-US" sz="1800" dirty="0" smtClean="0"/>
-              <a:t>1</a:t>
-            </a:r>
-          </a:p>
-          <a:p>
-            <a:pPr marL="741363" lvl="2" indent="0">
-              <a:buNone/>
-            </a:pPr>
-            <a:endParaRPr lang="en-US" sz="1800" dirty="0" smtClean="0"/>
-          </a:p>
-        </p:txBody>
-      </p:sp>
-      <p:sp>
-        <p:nvSpPr>
-          <p:cNvPr id="5" name="Slide Number Placeholder 3"/>
-          <p:cNvSpPr>
-            <a:spLocks noGrp="1"/>
-          </p:cNvSpPr>
-          <p:nvPr>
-            <p:ph type="sldNum" sz="quarter" idx="10"/>
-          </p:nvPr>
-        </p:nvSpPr>
-        <p:spPr>
-          <a:xfrm>
-            <a:off x="6910388" y="6253163"/>
-            <a:ext cx="2133600" cy="476250"/>
-          </a:xfrm>
-        </p:spPr>
-        <p:txBody>
-          <a:bodyPr/>
-          <a:lstStyle/>
-          <a:p>
-            <a:pPr>
-              <a:defRPr/>
-            </a:pPr>
-            <a:fld id="{62D6D4B2-7611-498F-8780-1EDC26277454}" type="slidenum">
-              <a:rPr lang="en-US" smtClean="0">
-                <a:solidFill>
-                  <a:srgbClr val="000000"/>
-                </a:solidFill>
-              </a:rPr>
-              <a:pPr>
-                <a:defRPr/>
-              </a:pPr>
-              <a:t>20</a:t>
+              <a:t>19</a:t>
             </a:fld>
             <a:endParaRPr lang="en-US" dirty="0">
               <a:solidFill>
@@ -14440,7 +13815,7 @@
 </p:sld>
 </file>
 
-<file path=ppt/slides/slide21.xml><?xml version="1.0" encoding="utf-8"?>
+<file path=ppt/slides/slide2.xml><?xml version="1.0" encoding="utf-8"?>
 <p:sld xmlns:a="http://schemas.openxmlformats.org/drawingml/2006/main" xmlns:r="http://schemas.openxmlformats.org/officeDocument/2006/relationships" xmlns:p="http://schemas.openxmlformats.org/presentationml/2006/main">
   <p:cSld>
     <p:spTree>
@@ -14473,8 +13848,8 @@
           <a:lstStyle/>
           <a:p>
             <a:r>
-              <a:rPr lang="en-US" dirty="0"/>
-              <a:t>Unused outputs and open keyword</a:t>
+              <a:rPr lang="en-US" dirty="0" smtClean="0"/>
+              <a:t>Lesson Outline</a:t>
             </a:r>
             <a:endParaRPr lang="en-US" dirty="0"/>
           </a:p>
@@ -14490,54 +13865,66 @@
             <p:ph idx="1"/>
           </p:nvPr>
         </p:nvSpPr>
-        <p:spPr>
-          <a:xfrm>
-            <a:off x="581736" y="1523052"/>
-            <a:ext cx="8131175" cy="4324350"/>
-          </a:xfrm>
-        </p:spPr>
+        <p:spPr/>
         <p:txBody>
           <a:bodyPr/>
           <a:lstStyle/>
           <a:p>
-            <a:r>
-              <a:rPr lang="en-US" dirty="0"/>
-              <a:t>Now lets build the </a:t>
-            </a:r>
-            <a:r>
-              <a:rPr lang="en-US" dirty="0" err="1"/>
-              <a:t>datapath</a:t>
-            </a:r>
-            <a:r>
-              <a:rPr lang="en-US" dirty="0"/>
-              <a:t> and control using the technique learned in lecture 10</a:t>
-            </a:r>
+            <a:pPr eaLnBrk="1" hangingPunct="1">
+              <a:lnSpc>
+                <a:spcPct val="80000"/>
+              </a:lnSpc>
+            </a:pPr>
             <a:r>
               <a:rPr lang="en-US" dirty="0" smtClean="0"/>
-              <a:t>.</a:t>
-            </a:r>
-          </a:p>
-          <a:p>
+              <a:t>Time Logs!</a:t>
+            </a:r>
+          </a:p>
+          <a:p>
+            <a:pPr eaLnBrk="1" hangingPunct="1">
+              <a:lnSpc>
+                <a:spcPct val="80000"/>
+              </a:lnSpc>
+            </a:pPr>
+            <a:r>
+              <a:rPr lang="en-US" dirty="0" err="1" smtClean="0"/>
+              <a:t>Datapath</a:t>
+            </a:r>
             <a:r>
               <a:rPr lang="en-US" dirty="0" smtClean="0"/>
-              <a:t>Your </a:t>
-            </a:r>
-            <a:r>
-              <a:rPr lang="en-US" dirty="0"/>
-              <a:t>homework is to build the control unit for the keyboard </a:t>
-            </a:r>
-            <a:r>
-              <a:rPr lang="en-US" dirty="0" err="1"/>
-              <a:t>scancode</a:t>
-            </a:r>
-            <a:r>
-              <a:rPr lang="en-US" dirty="0"/>
-              <a:t> reader</a:t>
+              <a:t> </a:t>
             </a:r>
             <a:r>
               <a:rPr lang="en-US" dirty="0" smtClean="0"/>
-              <a:t>.</a:t>
-            </a:r>
+              <a:t>and </a:t>
+            </a:r>
+            <a:r>
+              <a:rPr lang="en-US" dirty="0" smtClean="0"/>
+              <a:t>Control – Timing</a:t>
+            </a:r>
+          </a:p>
+          <a:p>
+            <a:pPr eaLnBrk="1" hangingPunct="1">
+              <a:lnSpc>
+                <a:spcPct val="80000"/>
+              </a:lnSpc>
+            </a:pPr>
+            <a:r>
+              <a:rPr lang="en-US" dirty="0" smtClean="0"/>
+              <a:t>VHDL Instantiation</a:t>
+            </a:r>
+          </a:p>
+          <a:p>
+            <a:pPr eaLnBrk="1" hangingPunct="1">
+              <a:lnSpc>
+                <a:spcPct val="80000"/>
+              </a:lnSpc>
+            </a:pPr>
+            <a:r>
+              <a:rPr lang="en-US" dirty="0" smtClean="0"/>
+              <a:t>Keyboard serial to parallel converter</a:t>
+            </a:r>
+            <a:endParaRPr lang="en-US" dirty="0" smtClean="0"/>
           </a:p>
         </p:txBody>
       </p:sp>
@@ -14573,7 +13960,170 @@
               <a:pPr>
                 <a:defRPr/>
               </a:pPr>
-              <a:t>21</a:t>
+              <a:t>2</a:t>
+            </a:fld>
+            <a:endParaRPr lang="en-US" dirty="0">
+              <a:solidFill>
+                <a:srgbClr val="000000"/>
+              </a:solidFill>
+            </a:endParaRPr>
+          </a:p>
+        </p:txBody>
+      </p:sp>
+    </p:spTree>
+    <p:extLst>
+      <p:ext uri="{BB962C8B-B14F-4D97-AF65-F5344CB8AC3E}">
+        <p14:creationId xmlns:p14="http://schemas.microsoft.com/office/powerpoint/2010/main" val="3991601210"/>
+      </p:ext>
+    </p:extLst>
+  </p:cSld>
+  <p:clrMapOvr>
+    <a:masterClrMapping/>
+  </p:clrMapOvr>
+  <p:timing>
+    <p:tnLst>
+      <p:par>
+        <p:cTn id="1" dur="indefinite" restart="never" nodeType="tmRoot"/>
+      </p:par>
+    </p:tnLst>
+  </p:timing>
+</p:sld>
+</file>
+
+<file path=ppt/slides/slide20.xml><?xml version="1.0" encoding="utf-8"?>
+<p:sld xmlns:a="http://schemas.openxmlformats.org/drawingml/2006/main" xmlns:r="http://schemas.openxmlformats.org/officeDocument/2006/relationships" xmlns:p="http://schemas.openxmlformats.org/presentationml/2006/main">
+  <p:cSld>
+    <p:spTree>
+      <p:nvGrpSpPr>
+        <p:cNvPr id="1" name=""/>
+        <p:cNvGrpSpPr/>
+        <p:nvPr/>
+      </p:nvGrpSpPr>
+      <p:grpSpPr>
+        <a:xfrm>
+          <a:off x="0" y="0"/>
+          <a:ext cx="0" cy="0"/>
+          <a:chOff x="0" y="0"/>
+          <a:chExt cx="0" cy="0"/>
+        </a:xfrm>
+      </p:grpSpPr>
+      <p:sp>
+        <p:nvSpPr>
+          <p:cNvPr id="2" name="Title 1"/>
+          <p:cNvSpPr>
+            <a:spLocks noGrp="1"/>
+          </p:cNvSpPr>
+          <p:nvPr>
+            <p:ph type="title"/>
+          </p:nvPr>
+        </p:nvSpPr>
+        <p:spPr/>
+        <p:txBody>
+          <a:bodyPr/>
+          <a:lstStyle/>
+          <a:p>
+            <a:r>
+              <a:rPr lang="en-US" dirty="0"/>
+              <a:t>Unused outputs and open keyword</a:t>
+            </a:r>
+            <a:endParaRPr lang="en-US" dirty="0"/>
+          </a:p>
+        </p:txBody>
+      </p:sp>
+      <p:sp>
+        <p:nvSpPr>
+          <p:cNvPr id="4" name="Content Placeholder 3"/>
+          <p:cNvSpPr>
+            <a:spLocks noGrp="1"/>
+          </p:cNvSpPr>
+          <p:nvPr>
+            <p:ph idx="1"/>
+          </p:nvPr>
+        </p:nvSpPr>
+        <p:spPr>
+          <a:xfrm>
+            <a:off x="581736" y="1523052"/>
+            <a:ext cx="8131175" cy="4324350"/>
+          </a:xfrm>
+        </p:spPr>
+        <p:txBody>
+          <a:bodyPr/>
+          <a:lstStyle/>
+          <a:p>
+            <a:r>
+              <a:rPr lang="en-US" dirty="0"/>
+              <a:t>Now lets build the </a:t>
+            </a:r>
+            <a:r>
+              <a:rPr lang="en-US" dirty="0" err="1"/>
+              <a:t>datapath</a:t>
+            </a:r>
+            <a:r>
+              <a:rPr lang="en-US" dirty="0"/>
+              <a:t> and control using the technique learned in lecture 10</a:t>
+            </a:r>
+            <a:r>
+              <a:rPr lang="en-US" dirty="0" smtClean="0"/>
+              <a:t>.</a:t>
+            </a:r>
+          </a:p>
+          <a:p>
+            <a:r>
+              <a:rPr lang="en-US" dirty="0" smtClean="0"/>
+              <a:t>Your </a:t>
+            </a:r>
+            <a:r>
+              <a:rPr lang="en-US" dirty="0"/>
+              <a:t>homework is to build the control unit for the keyboard </a:t>
+            </a:r>
+            <a:r>
+              <a:rPr lang="en-US" dirty="0" err="1"/>
+              <a:t>scancode</a:t>
+            </a:r>
+            <a:r>
+              <a:rPr lang="en-US" dirty="0"/>
+              <a:t> reader</a:t>
+            </a:r>
+            <a:r>
+              <a:rPr lang="en-US" dirty="0" smtClean="0"/>
+              <a:t>.</a:t>
+            </a:r>
+          </a:p>
+        </p:txBody>
+      </p:sp>
+      <p:sp>
+        <p:nvSpPr>
+          <p:cNvPr id="5" name="Slide Number Placeholder 3"/>
+          <p:cNvSpPr>
+            <a:spLocks noGrp="1"/>
+          </p:cNvSpPr>
+          <p:nvPr>
+            <p:ph type="sldNum" sz="quarter" idx="10"/>
+          </p:nvPr>
+        </p:nvSpPr>
+        <p:spPr>
+          <a:xfrm>
+            <a:off x="6910388" y="6253163"/>
+            <a:ext cx="2133600" cy="476250"/>
+          </a:xfrm>
+        </p:spPr>
+        <p:txBody>
+          <a:bodyPr/>
+          <a:lstStyle/>
+          <a:p>
+            <a:pPr>
+              <a:defRPr/>
+            </a:pPr>
+            <a:fld id="{62D6D4B2-7611-498F-8780-1EDC26277454}" type="slidenum">
+              <a:rPr lang="en-US" smtClean="0">
+                <a:solidFill>
+                  <a:srgbClr val="000000"/>
+                </a:solidFill>
+              </a:rPr>
+              <a:pPr>
+                <a:defRPr/>
+              </a:pPr>
+              <a:t>20</a:t>
             </a:fld>
             <a:endParaRPr lang="en-US" dirty="0">
               <a:solidFill>

</xml_diff>